<commit_message>
updated icon images in ppt
</commit_message>
<xml_diff>
--- a/misc/ppt/limitless.pptx
+++ b/misc/ppt/limitless.pptx
@@ -733,7 +733,7 @@
           <a:p>
             <a:fld id="{15C64120-FFF4-4745-9F76-477E49F74189}" type="datetimeFigureOut">
               <a:rPr lang="en-US" smtClean="0"/>
-              <a:t>7/4/14</a:t>
+              <a:t>7/5/14</a:t>
             </a:fld>
             <a:endParaRPr lang="en-US"/>
           </a:p>
@@ -903,7 +903,7 @@
           <a:p>
             <a:fld id="{15C64120-FFF4-4745-9F76-477E49F74189}" type="datetimeFigureOut">
               <a:rPr lang="en-US" smtClean="0"/>
-              <a:t>7/4/14</a:t>
+              <a:t>7/5/14</a:t>
             </a:fld>
             <a:endParaRPr lang="en-US"/>
           </a:p>
@@ -1083,7 +1083,7 @@
           <a:p>
             <a:fld id="{15C64120-FFF4-4745-9F76-477E49F74189}" type="datetimeFigureOut">
               <a:rPr lang="en-US" smtClean="0"/>
-              <a:t>7/4/14</a:t>
+              <a:t>7/5/14</a:t>
             </a:fld>
             <a:endParaRPr lang="en-US"/>
           </a:p>
@@ -1253,7 +1253,7 @@
           <a:p>
             <a:fld id="{15C64120-FFF4-4745-9F76-477E49F74189}" type="datetimeFigureOut">
               <a:rPr lang="en-US" smtClean="0"/>
-              <a:t>7/4/14</a:t>
+              <a:t>7/5/14</a:t>
             </a:fld>
             <a:endParaRPr lang="en-US"/>
           </a:p>
@@ -1499,7 +1499,7 @@
           <a:p>
             <a:fld id="{15C64120-FFF4-4745-9F76-477E49F74189}" type="datetimeFigureOut">
               <a:rPr lang="en-US" smtClean="0"/>
-              <a:t>7/4/14</a:t>
+              <a:t>7/5/14</a:t>
             </a:fld>
             <a:endParaRPr lang="en-US"/>
           </a:p>
@@ -1787,7 +1787,7 @@
           <a:p>
             <a:fld id="{15C64120-FFF4-4745-9F76-477E49F74189}" type="datetimeFigureOut">
               <a:rPr lang="en-US" smtClean="0"/>
-              <a:t>7/4/14</a:t>
+              <a:t>7/5/14</a:t>
             </a:fld>
             <a:endParaRPr lang="en-US"/>
           </a:p>
@@ -2209,7 +2209,7 @@
           <a:p>
             <a:fld id="{15C64120-FFF4-4745-9F76-477E49F74189}" type="datetimeFigureOut">
               <a:rPr lang="en-US" smtClean="0"/>
-              <a:t>7/4/14</a:t>
+              <a:t>7/5/14</a:t>
             </a:fld>
             <a:endParaRPr lang="en-US"/>
           </a:p>
@@ -2327,7 +2327,7 @@
           <a:p>
             <a:fld id="{15C64120-FFF4-4745-9F76-477E49F74189}" type="datetimeFigureOut">
               <a:rPr lang="en-US" smtClean="0"/>
-              <a:t>7/4/14</a:t>
+              <a:t>7/5/14</a:t>
             </a:fld>
             <a:endParaRPr lang="en-US"/>
           </a:p>
@@ -2422,7 +2422,7 @@
           <a:p>
             <a:fld id="{15C64120-FFF4-4745-9F76-477E49F74189}" type="datetimeFigureOut">
               <a:rPr lang="en-US" smtClean="0"/>
-              <a:t>7/4/14</a:t>
+              <a:t>7/5/14</a:t>
             </a:fld>
             <a:endParaRPr lang="en-US"/>
           </a:p>
@@ -2699,7 +2699,7 @@
           <a:p>
             <a:fld id="{15C64120-FFF4-4745-9F76-477E49F74189}" type="datetimeFigureOut">
               <a:rPr lang="en-US" smtClean="0"/>
-              <a:t>7/4/14</a:t>
+              <a:t>7/5/14</a:t>
             </a:fld>
             <a:endParaRPr lang="en-US"/>
           </a:p>
@@ -2952,7 +2952,7 @@
           <a:p>
             <a:fld id="{15C64120-FFF4-4745-9F76-477E49F74189}" type="datetimeFigureOut">
               <a:rPr lang="en-US" smtClean="0"/>
-              <a:t>7/4/14</a:t>
+              <a:t>7/5/14</a:t>
             </a:fld>
             <a:endParaRPr lang="en-US"/>
           </a:p>
@@ -3168,7 +3168,7 @@
           <a:p>
             <a:fld id="{15C64120-FFF4-4745-9F76-477E49F74189}" type="datetimeFigureOut">
               <a:rPr lang="en-US" smtClean="0"/>
-              <a:t>7/4/14</a:t>
+              <a:t>7/5/14</a:t>
             </a:fld>
             <a:endParaRPr lang="en-US"/>
           </a:p>
@@ -3846,11 +3846,13 @@
         <p:spPr>
           <a:xfrm>
             <a:off x="216839" y="960232"/>
-            <a:ext cx="8735492" cy="4599748"/>
-          </a:xfrm>
-        </p:spPr>
-        <p:txBody>
-          <a:bodyPr/>
+            <a:ext cx="8735492" cy="4917224"/>
+          </a:xfrm>
+        </p:spPr>
+        <p:txBody>
+          <a:bodyPr>
+            <a:normAutofit lnSpcReduction="10000"/>
+          </a:bodyPr>
           <a:lstStyle/>
           <a:p>
             <a:pPr marL="0" indent="0" algn="ctr">
@@ -3862,71 +3864,13 @@
                   <a:srgbClr val="595959"/>
                 </a:solidFill>
               </a:rPr>
-              <a:t>https://</a:t>
-            </a:r>
-            <a:r>
-              <a:rPr lang="en-US" dirty="0" err="1" smtClean="0">
-                <a:solidFill>
-                  <a:srgbClr val="595959"/>
-                </a:solidFill>
-              </a:rPr>
-              <a:t>github.com</a:t>
-            </a:r>
-            <a:r>
-              <a:rPr lang="en-US" dirty="0" smtClean="0">
-                <a:solidFill>
-                  <a:srgbClr val="595959"/>
-                </a:solidFill>
-              </a:rPr>
-              <a:t>/</a:t>
-            </a:r>
-            <a:r>
-              <a:rPr lang="en-US" dirty="0" err="1" smtClean="0">
-                <a:solidFill>
-                  <a:srgbClr val="595959"/>
-                </a:solidFill>
-              </a:rPr>
-              <a:t>sathishvj</a:t>
-            </a:r>
-            <a:r>
-              <a:rPr lang="en-US" dirty="0" smtClean="0">
-                <a:solidFill>
-                  <a:srgbClr val="595959"/>
-                </a:solidFill>
-              </a:rPr>
-              <a:t>/limitless</a:t>
-            </a:r>
-          </a:p>
-          <a:p>
-            <a:pPr marL="0" indent="0" algn="ctr">
-              <a:buNone/>
-            </a:pPr>
+              <a:t>         API</a:t>
+            </a:r>
             <a:endParaRPr lang="en-US" dirty="0" smtClean="0">
               <a:solidFill>
                 <a:srgbClr val="595959"/>
               </a:solidFill>
             </a:endParaRPr>
-          </a:p>
-          <a:p>
-            <a:pPr marL="0" indent="0" algn="ctr">
-              <a:buNone/>
-            </a:pPr>
-            <a:r>
-              <a:rPr lang="en-US" dirty="0" err="1" smtClean="0">
-                <a:solidFill>
-                  <a:srgbClr val="595959"/>
-                </a:solidFill>
-              </a:rPr>
-              <a:t>Frrole</a:t>
-            </a:r>
-            <a:r>
-              <a:rPr lang="en-US" dirty="0" smtClean="0">
-                <a:solidFill>
-                  <a:srgbClr val="595959"/>
-                </a:solidFill>
-              </a:rPr>
-              <a:t> API</a:t>
-            </a:r>
           </a:p>
           <a:p>
             <a:pPr marL="0" indent="0" algn="ctr">
@@ -3975,28 +3919,31 @@
             <a:pPr marL="0" indent="0" algn="ctr">
               <a:buNone/>
             </a:pPr>
+            <a:endParaRPr lang="en-US" dirty="0" smtClean="0">
+              <a:solidFill>
+                <a:srgbClr val="595959"/>
+              </a:solidFill>
+            </a:endParaRPr>
+          </a:p>
+          <a:p>
+            <a:pPr marL="0" indent="0" algn="ctr">
+              <a:buNone/>
+            </a:pPr>
             <a:r>
               <a:rPr lang="en-US" dirty="0" smtClean="0">
                 <a:solidFill>
                   <a:srgbClr val="595959"/>
                 </a:solidFill>
               </a:rPr>
-              <a:t/>
-            </a:r>
-            <a:br>
+              <a:t>works </a:t>
+            </a:r>
+            <a:r>
               <a:rPr lang="en-US" dirty="0" smtClean="0">
                 <a:solidFill>
                   <a:srgbClr val="595959"/>
                 </a:solidFill>
               </a:rPr>
-            </a:br>
-            <a:r>
-              <a:rPr lang="en-US" dirty="0" smtClean="0">
-                <a:solidFill>
-                  <a:srgbClr val="595959"/>
-                </a:solidFill>
-              </a:rPr>
-              <a:t>works natively on Windows Phone, Android, </a:t>
+              <a:t>natively on Windows Phone, Android, </a:t>
             </a:r>
             <a:r>
               <a:rPr lang="en-US" dirty="0" err="1" smtClean="0">
@@ -4012,11 +3959,336 @@
                   <a:srgbClr val="595959"/>
                 </a:solidFill>
               </a:rPr>
-              <a:t>, …</a:t>
-            </a:r>
-          </a:p>
-        </p:txBody>
-      </p:sp>
+              <a:t>, </a:t>
+            </a:r>
+            <a:r>
+              <a:rPr lang="en-US" dirty="0" smtClean="0">
+                <a:solidFill>
+                  <a:srgbClr val="595959"/>
+                </a:solidFill>
+              </a:rPr>
+              <a:t>…</a:t>
+            </a:r>
+          </a:p>
+          <a:p>
+            <a:pPr marL="0" indent="0" algn="ctr">
+              <a:buNone/>
+            </a:pPr>
+            <a:endParaRPr lang="en-US" dirty="0" smtClean="0">
+              <a:solidFill>
+                <a:srgbClr val="595959"/>
+              </a:solidFill>
+            </a:endParaRPr>
+          </a:p>
+          <a:p>
+            <a:pPr marL="0" indent="0" algn="ctr">
+              <a:buNone/>
+            </a:pPr>
+            <a:endParaRPr lang="en-US" dirty="0">
+              <a:solidFill>
+                <a:srgbClr val="595959"/>
+              </a:solidFill>
+            </a:endParaRPr>
+          </a:p>
+          <a:p>
+            <a:pPr marL="0" indent="0" algn="ctr">
+              <a:buNone/>
+            </a:pPr>
+            <a:r>
+              <a:rPr lang="en-US" dirty="0">
+                <a:solidFill>
+                  <a:srgbClr val="595959"/>
+                </a:solidFill>
+              </a:rPr>
+              <a:t>https://</a:t>
+            </a:r>
+            <a:r>
+              <a:rPr lang="en-US" dirty="0" err="1">
+                <a:solidFill>
+                  <a:srgbClr val="595959"/>
+                </a:solidFill>
+              </a:rPr>
+              <a:t>github.com</a:t>
+            </a:r>
+            <a:r>
+              <a:rPr lang="en-US" dirty="0">
+                <a:solidFill>
+                  <a:srgbClr val="595959"/>
+                </a:solidFill>
+              </a:rPr>
+              <a:t>/</a:t>
+            </a:r>
+            <a:r>
+              <a:rPr lang="en-US" dirty="0" err="1">
+                <a:solidFill>
+                  <a:srgbClr val="595959"/>
+                </a:solidFill>
+              </a:rPr>
+              <a:t>sathishvj</a:t>
+            </a:r>
+            <a:r>
+              <a:rPr lang="en-US" dirty="0">
+                <a:solidFill>
+                  <a:srgbClr val="595959"/>
+                </a:solidFill>
+              </a:rPr>
+              <a:t>/</a:t>
+            </a:r>
+            <a:r>
+              <a:rPr lang="en-US" dirty="0" smtClean="0">
+                <a:solidFill>
+                  <a:srgbClr val="595959"/>
+                </a:solidFill>
+              </a:rPr>
+              <a:t>limitless</a:t>
+            </a:r>
+            <a:endParaRPr lang="en-US" dirty="0">
+              <a:solidFill>
+                <a:srgbClr val="595959"/>
+              </a:solidFill>
+            </a:endParaRPr>
+          </a:p>
+        </p:txBody>
+      </p:sp>
+      <p:pic>
+        <p:nvPicPr>
+          <p:cNvPr id="4" name="Picture 3"/>
+          <p:cNvPicPr>
+            <a:picLocks noChangeAspect="1"/>
+          </p:cNvPicPr>
+          <p:nvPr/>
+        </p:nvPicPr>
+        <p:blipFill>
+          <a:blip r:embed="rId2"/>
+          <a:stretch>
+            <a:fillRect/>
+          </a:stretch>
+        </p:blipFill>
+        <p:spPr>
+          <a:xfrm>
+            <a:off x="2992667" y="1014420"/>
+            <a:ext cx="1495805" cy="591747"/>
+          </a:xfrm>
+          <a:prstGeom prst="rect">
+            <a:avLst/>
+          </a:prstGeom>
+        </p:spPr>
+      </p:pic>
+      <p:pic>
+        <p:nvPicPr>
+          <p:cNvPr id="5" name="Picture 4"/>
+          <p:cNvPicPr>
+            <a:picLocks noChangeAspect="1"/>
+          </p:cNvPicPr>
+          <p:nvPr/>
+        </p:nvPicPr>
+        <p:blipFill>
+          <a:blip r:embed="rId3"/>
+          <a:stretch>
+            <a:fillRect/>
+          </a:stretch>
+        </p:blipFill>
+        <p:spPr>
+          <a:xfrm>
+            <a:off x="1936058" y="2619002"/>
+            <a:ext cx="539058" cy="539058"/>
+          </a:xfrm>
+          <a:prstGeom prst="rect">
+            <a:avLst/>
+          </a:prstGeom>
+        </p:spPr>
+      </p:pic>
+      <p:pic>
+        <p:nvPicPr>
+          <p:cNvPr id="6" name="Picture 5"/>
+          <p:cNvPicPr>
+            <a:picLocks noChangeAspect="1"/>
+          </p:cNvPicPr>
+          <p:nvPr/>
+        </p:nvPicPr>
+        <p:blipFill rotWithShape="1">
+          <a:blip r:embed="rId4"/>
+          <a:srcRect b="41397"/>
+          <a:stretch/>
+        </p:blipFill>
+        <p:spPr>
+          <a:xfrm>
+            <a:off x="3293093" y="2619002"/>
+            <a:ext cx="656464" cy="427023"/>
+          </a:xfrm>
+          <a:prstGeom prst="rect">
+            <a:avLst/>
+          </a:prstGeom>
+        </p:spPr>
+      </p:pic>
+      <p:pic>
+        <p:nvPicPr>
+          <p:cNvPr id="7" name="Picture 6"/>
+          <p:cNvPicPr>
+            <a:picLocks noChangeAspect="1"/>
+          </p:cNvPicPr>
+          <p:nvPr/>
+        </p:nvPicPr>
+        <p:blipFill>
+          <a:blip r:embed="rId5"/>
+          <a:stretch>
+            <a:fillRect/>
+          </a:stretch>
+        </p:blipFill>
+        <p:spPr>
+          <a:xfrm>
+            <a:off x="4446569" y="2624372"/>
+            <a:ext cx="421653" cy="421653"/>
+          </a:xfrm>
+          <a:prstGeom prst="rect">
+            <a:avLst/>
+          </a:prstGeom>
+        </p:spPr>
+      </p:pic>
+      <p:pic>
+        <p:nvPicPr>
+          <p:cNvPr id="8" name="Picture 7"/>
+          <p:cNvPicPr>
+            <a:picLocks noChangeAspect="1"/>
+          </p:cNvPicPr>
+          <p:nvPr/>
+        </p:nvPicPr>
+        <p:blipFill>
+          <a:blip r:embed="rId6"/>
+          <a:stretch>
+            <a:fillRect/>
+          </a:stretch>
+        </p:blipFill>
+        <p:spPr>
+          <a:xfrm>
+            <a:off x="5448475" y="2624372"/>
+            <a:ext cx="437140" cy="437140"/>
+          </a:xfrm>
+          <a:prstGeom prst="rect">
+            <a:avLst/>
+          </a:prstGeom>
+        </p:spPr>
+      </p:pic>
+      <p:pic>
+        <p:nvPicPr>
+          <p:cNvPr id="9" name="Picture 8"/>
+          <p:cNvPicPr>
+            <a:picLocks noChangeAspect="1"/>
+          </p:cNvPicPr>
+          <p:nvPr/>
+        </p:nvPicPr>
+        <p:blipFill>
+          <a:blip r:embed="rId7"/>
+          <a:stretch>
+            <a:fillRect/>
+          </a:stretch>
+        </p:blipFill>
+        <p:spPr>
+          <a:xfrm>
+            <a:off x="6680125" y="2619002"/>
+            <a:ext cx="405845" cy="405845"/>
+          </a:xfrm>
+          <a:prstGeom prst="rect">
+            <a:avLst/>
+          </a:prstGeom>
+        </p:spPr>
+      </p:pic>
+      <p:pic>
+        <p:nvPicPr>
+          <p:cNvPr id="10" name="Picture 9"/>
+          <p:cNvPicPr>
+            <a:picLocks noChangeAspect="1"/>
+          </p:cNvPicPr>
+          <p:nvPr/>
+        </p:nvPicPr>
+        <p:blipFill>
+          <a:blip r:embed="rId8"/>
+          <a:stretch>
+            <a:fillRect/>
+          </a:stretch>
+        </p:blipFill>
+        <p:spPr>
+          <a:xfrm>
+            <a:off x="4314918" y="4126238"/>
+            <a:ext cx="746910" cy="570049"/>
+          </a:xfrm>
+          <a:prstGeom prst="rect">
+            <a:avLst/>
+          </a:prstGeom>
+        </p:spPr>
+      </p:pic>
+      <p:pic>
+        <p:nvPicPr>
+          <p:cNvPr id="11" name="Picture 10"/>
+          <p:cNvPicPr>
+            <a:picLocks noChangeAspect="1"/>
+          </p:cNvPicPr>
+          <p:nvPr/>
+        </p:nvPicPr>
+        <p:blipFill>
+          <a:blip r:embed="rId9"/>
+          <a:stretch>
+            <a:fillRect/>
+          </a:stretch>
+        </p:blipFill>
+        <p:spPr>
+          <a:xfrm>
+            <a:off x="6424578" y="4126238"/>
+            <a:ext cx="661392" cy="595074"/>
+          </a:xfrm>
+          <a:prstGeom prst="rect">
+            <a:avLst/>
+          </a:prstGeom>
+        </p:spPr>
+      </p:pic>
+      <p:pic>
+        <p:nvPicPr>
+          <p:cNvPr id="12" name="Picture 11"/>
+          <p:cNvPicPr>
+            <a:picLocks noChangeAspect="1"/>
+          </p:cNvPicPr>
+          <p:nvPr/>
+        </p:nvPicPr>
+        <p:blipFill>
+          <a:blip r:embed="rId10"/>
+          <a:stretch>
+            <a:fillRect/>
+          </a:stretch>
+        </p:blipFill>
+        <p:spPr>
+          <a:xfrm>
+            <a:off x="7473183" y="4126238"/>
+            <a:ext cx="1003286" cy="570049"/>
+          </a:xfrm>
+          <a:prstGeom prst="rect">
+            <a:avLst/>
+          </a:prstGeom>
+        </p:spPr>
+      </p:pic>
+      <p:pic>
+        <p:nvPicPr>
+          <p:cNvPr id="13" name="Picture 12"/>
+          <p:cNvPicPr>
+            <a:picLocks noChangeAspect="1"/>
+          </p:cNvPicPr>
+          <p:nvPr/>
+        </p:nvPicPr>
+        <p:blipFill>
+          <a:blip r:embed="rId11"/>
+          <a:stretch>
+            <a:fillRect/>
+          </a:stretch>
+        </p:blipFill>
+        <p:spPr>
+          <a:xfrm>
+            <a:off x="2992667" y="5743012"/>
+            <a:ext cx="670669" cy="557494"/>
+          </a:xfrm>
+          <a:prstGeom prst="rect">
+            <a:avLst/>
+          </a:prstGeom>
+        </p:spPr>
+      </p:pic>
     </p:spTree>
     <p:extLst>
       <p:ext uri="{BB962C8B-B14F-4D97-AF65-F5344CB8AC3E}">

</xml_diff>

<commit_message>
made updates to the ppt
</commit_message>
<xml_diff>
--- a/misc/ppt/limitless.pptx
+++ b/misc/ppt/limitless.pptx
@@ -5,7 +5,7 @@
     <p:sldMasterId id="2147483648" r:id="rId1"/>
   </p:sldMasterIdLst>
   <p:notesMasterIdLst>
-    <p:notesMasterId r:id="rId11"/>
+    <p:notesMasterId r:id="rId10"/>
   </p:notesMasterIdLst>
   <p:sldIdLst>
     <p:sldId id="256" r:id="rId2"/>
@@ -14,9 +14,8 @@
     <p:sldId id="260" r:id="rId5"/>
     <p:sldId id="262" r:id="rId6"/>
     <p:sldId id="257" r:id="rId7"/>
-    <p:sldId id="263" r:id="rId8"/>
-    <p:sldId id="265" r:id="rId9"/>
-    <p:sldId id="264" r:id="rId10"/>
+    <p:sldId id="265" r:id="rId8"/>
+    <p:sldId id="263" r:id="rId9"/>
   </p:sldIdLst>
   <p:sldSz cx="9144000" cy="6858000" type="screen4x3"/>
   <p:notesSz cx="6858000" cy="9144000"/>
@@ -200,7 +199,7 @@
           <a:p>
             <a:fld id="{0E0C3486-EAA8-EA49-AB9A-B10E851F16CE}" type="datetimeFigureOut">
               <a:rPr lang="en-US" smtClean="0"/>
-              <a:t>7/5/14</a:t>
+              <a:t>7/6/14</a:t>
             </a:fld>
             <a:endParaRPr lang="en-US"/>
           </a:p>
@@ -733,7 +732,7 @@
           <a:p>
             <a:fld id="{15C64120-FFF4-4745-9F76-477E49F74189}" type="datetimeFigureOut">
               <a:rPr lang="en-US" smtClean="0"/>
-              <a:t>7/5/14</a:t>
+              <a:t>7/6/14</a:t>
             </a:fld>
             <a:endParaRPr lang="en-US"/>
           </a:p>
@@ -903,7 +902,7 @@
           <a:p>
             <a:fld id="{15C64120-FFF4-4745-9F76-477E49F74189}" type="datetimeFigureOut">
               <a:rPr lang="en-US" smtClean="0"/>
-              <a:t>7/5/14</a:t>
+              <a:t>7/6/14</a:t>
             </a:fld>
             <a:endParaRPr lang="en-US"/>
           </a:p>
@@ -1083,7 +1082,7 @@
           <a:p>
             <a:fld id="{15C64120-FFF4-4745-9F76-477E49F74189}" type="datetimeFigureOut">
               <a:rPr lang="en-US" smtClean="0"/>
-              <a:t>7/5/14</a:t>
+              <a:t>7/6/14</a:t>
             </a:fld>
             <a:endParaRPr lang="en-US"/>
           </a:p>
@@ -1253,7 +1252,7 @@
           <a:p>
             <a:fld id="{15C64120-FFF4-4745-9F76-477E49F74189}" type="datetimeFigureOut">
               <a:rPr lang="en-US" smtClean="0"/>
-              <a:t>7/5/14</a:t>
+              <a:t>7/6/14</a:t>
             </a:fld>
             <a:endParaRPr lang="en-US"/>
           </a:p>
@@ -1499,7 +1498,7 @@
           <a:p>
             <a:fld id="{15C64120-FFF4-4745-9F76-477E49F74189}" type="datetimeFigureOut">
               <a:rPr lang="en-US" smtClean="0"/>
-              <a:t>7/5/14</a:t>
+              <a:t>7/6/14</a:t>
             </a:fld>
             <a:endParaRPr lang="en-US"/>
           </a:p>
@@ -1787,7 +1786,7 @@
           <a:p>
             <a:fld id="{15C64120-FFF4-4745-9F76-477E49F74189}" type="datetimeFigureOut">
               <a:rPr lang="en-US" smtClean="0"/>
-              <a:t>7/5/14</a:t>
+              <a:t>7/6/14</a:t>
             </a:fld>
             <a:endParaRPr lang="en-US"/>
           </a:p>
@@ -2209,7 +2208,7 @@
           <a:p>
             <a:fld id="{15C64120-FFF4-4745-9F76-477E49F74189}" type="datetimeFigureOut">
               <a:rPr lang="en-US" smtClean="0"/>
-              <a:t>7/5/14</a:t>
+              <a:t>7/6/14</a:t>
             </a:fld>
             <a:endParaRPr lang="en-US"/>
           </a:p>
@@ -2327,7 +2326,7 @@
           <a:p>
             <a:fld id="{15C64120-FFF4-4745-9F76-477E49F74189}" type="datetimeFigureOut">
               <a:rPr lang="en-US" smtClean="0"/>
-              <a:t>7/5/14</a:t>
+              <a:t>7/6/14</a:t>
             </a:fld>
             <a:endParaRPr lang="en-US"/>
           </a:p>
@@ -2422,7 +2421,7 @@
           <a:p>
             <a:fld id="{15C64120-FFF4-4745-9F76-477E49F74189}" type="datetimeFigureOut">
               <a:rPr lang="en-US" smtClean="0"/>
-              <a:t>7/5/14</a:t>
+              <a:t>7/6/14</a:t>
             </a:fld>
             <a:endParaRPr lang="en-US"/>
           </a:p>
@@ -2699,7 +2698,7 @@
           <a:p>
             <a:fld id="{15C64120-FFF4-4745-9F76-477E49F74189}" type="datetimeFigureOut">
               <a:rPr lang="en-US" smtClean="0"/>
-              <a:t>7/5/14</a:t>
+              <a:t>7/6/14</a:t>
             </a:fld>
             <a:endParaRPr lang="en-US"/>
           </a:p>
@@ -2952,7 +2951,7 @@
           <a:p>
             <a:fld id="{15C64120-FFF4-4745-9F76-477E49F74189}" type="datetimeFigureOut">
               <a:rPr lang="en-US" smtClean="0"/>
-              <a:t>7/5/14</a:t>
+              <a:t>7/6/14</a:t>
             </a:fld>
             <a:endParaRPr lang="en-US"/>
           </a:p>
@@ -3168,7 +3167,7 @@
           <a:p>
             <a:fld id="{15C64120-FFF4-4745-9F76-477E49F74189}" type="datetimeFigureOut">
               <a:rPr lang="en-US" smtClean="0"/>
-              <a:t>7/5/14</a:t>
+              <a:t>7/6/14</a:t>
             </a:fld>
             <a:endParaRPr lang="en-US"/>
           </a:p>
@@ -3813,6 +3812,13 @@
   <p:clrMapOvr>
     <a:masterClrMapping/>
   </p:clrMapOvr>
+  <p:timing>
+    <p:tnLst>
+      <p:par>
+        <p:cTn xmlns:p14="http://schemas.microsoft.com/office/powerpoint/2010/main" id="1" dur="indefinite" restart="never" nodeType="tmRoot"/>
+      </p:par>
+    </p:tnLst>
+  </p:timing>
 </p:sld>
 </file>
 
@@ -3866,11 +3872,6 @@
               </a:rPr>
               <a:t>         API</a:t>
             </a:r>
-            <a:endParaRPr lang="en-US" dirty="0" smtClean="0">
-              <a:solidFill>
-                <a:srgbClr val="595959"/>
-              </a:solidFill>
-            </a:endParaRPr>
           </a:p>
           <a:p>
             <a:pPr marL="0" indent="0" algn="ctr">
@@ -3935,15 +3936,7 @@
                   <a:srgbClr val="595959"/>
                 </a:solidFill>
               </a:rPr>
-              <a:t>works </a:t>
-            </a:r>
-            <a:r>
-              <a:rPr lang="en-US" dirty="0" smtClean="0">
-                <a:solidFill>
-                  <a:srgbClr val="595959"/>
-                </a:solidFill>
-              </a:rPr>
-              <a:t>natively on Windows Phone, Android, </a:t>
+              <a:t>works natively on Windows Phone, Android, </a:t>
             </a:r>
             <a:r>
               <a:rPr lang="en-US" dirty="0" err="1" smtClean="0">
@@ -3959,15 +3952,7 @@
                   <a:srgbClr val="595959"/>
                 </a:solidFill>
               </a:rPr>
-              <a:t>, </a:t>
-            </a:r>
-            <a:r>
-              <a:rPr lang="en-US" dirty="0" smtClean="0">
-                <a:solidFill>
-                  <a:srgbClr val="595959"/>
-                </a:solidFill>
-              </a:rPr>
-              <a:t>…</a:t>
+              <a:t>, …</a:t>
             </a:r>
           </a:p>
           <a:p>
@@ -4281,7 +4266,7 @@
         </p:blipFill>
         <p:spPr>
           <a:xfrm>
-            <a:off x="2992667" y="5743012"/>
+            <a:off x="4111234" y="5743012"/>
             <a:ext cx="670669" cy="557494"/>
           </a:xfrm>
           <a:prstGeom prst="rect">
@@ -4299,6 +4284,13 @@
   <p:clrMapOvr>
     <a:masterClrMapping/>
   </p:clrMapOvr>
+  <p:timing>
+    <p:tnLst>
+      <p:par>
+        <p:cTn xmlns:p14="http://schemas.microsoft.com/office/powerpoint/2010/main" id="1" dur="indefinite" restart="never" nodeType="tmRoot"/>
+      </p:par>
+    </p:tnLst>
+  </p:timing>
 </p:sld>
 </file>
 
@@ -4453,6 +4445,13 @@
   <p:clrMapOvr>
     <a:masterClrMapping/>
   </p:clrMapOvr>
+  <p:timing>
+    <p:tnLst>
+      <p:par>
+        <p:cTn xmlns:p14="http://schemas.microsoft.com/office/powerpoint/2010/main" id="1" dur="indefinite" restart="never" nodeType="tmRoot"/>
+      </p:par>
+    </p:tnLst>
+  </p:timing>
 </p:sld>
 </file>
 
@@ -4840,6 +4839,13 @@
   <p:clrMapOvr>
     <a:masterClrMapping/>
   </p:clrMapOvr>
+  <p:timing>
+    <p:tnLst>
+      <p:par>
+        <p:cTn xmlns:p14="http://schemas.microsoft.com/office/powerpoint/2010/main" id="1" dur="indefinite" restart="never" nodeType="tmRoot"/>
+      </p:par>
+    </p:tnLst>
+  </p:timing>
 </p:sld>
 </file>
 
@@ -5240,6 +5246,13 @@
   <p:clrMapOvr>
     <a:masterClrMapping/>
   </p:clrMapOvr>
+  <p:timing>
+    <p:tnLst>
+      <p:par>
+        <p:cTn xmlns:p14="http://schemas.microsoft.com/office/powerpoint/2010/main" id="1" dur="indefinite" restart="never" nodeType="tmRoot"/>
+      </p:par>
+    </p:tnLst>
+  </p:timing>
 </p:sld>
 </file>
 
@@ -5631,10 +5644,143 @@
   <p:clrMapOvr>
     <a:masterClrMapping/>
   </p:clrMapOvr>
+  <p:timing>
+    <p:tnLst>
+      <p:par>
+        <p:cTn xmlns:p14="http://schemas.microsoft.com/office/powerpoint/2010/main" id="1" dur="indefinite" restart="never" nodeType="tmRoot"/>
+      </p:par>
+    </p:tnLst>
+  </p:timing>
 </p:sld>
 </file>
 
 <file path=ppt/slides/slide7.xml><?xml version="1.0" encoding="utf-8"?>
+<p:sld xmlns:a="http://schemas.openxmlformats.org/drawingml/2006/main" xmlns:r="http://schemas.openxmlformats.org/officeDocument/2006/relationships" xmlns:p="http://schemas.openxmlformats.org/presentationml/2006/main">
+  <p:cSld>
+    <p:spTree>
+      <p:nvGrpSpPr>
+        <p:cNvPr id="1" name=""/>
+        <p:cNvGrpSpPr/>
+        <p:nvPr/>
+      </p:nvGrpSpPr>
+      <p:grpSpPr>
+        <a:xfrm>
+          <a:off x="0" y="0"/>
+          <a:ext cx="0" cy="0"/>
+          <a:chOff x="0" y="0"/>
+          <a:chExt cx="0" cy="0"/>
+        </a:xfrm>
+      </p:grpSpPr>
+      <p:sp>
+        <p:nvSpPr>
+          <p:cNvPr id="4" name="Content Placeholder 2"/>
+          <p:cNvSpPr>
+            <a:spLocks noGrp="1"/>
+          </p:cNvSpPr>
+          <p:nvPr>
+            <p:ph idx="1"/>
+          </p:nvPr>
+        </p:nvSpPr>
+        <p:spPr>
+          <a:xfrm>
+            <a:off x="391835" y="5939320"/>
+            <a:ext cx="2194723" cy="735735"/>
+          </a:xfrm>
+        </p:spPr>
+        <p:txBody>
+          <a:bodyPr vert="horz" lIns="91440" tIns="45720" rIns="91440" bIns="45720" rtlCol="0">
+            <a:normAutofit/>
+          </a:bodyPr>
+          <a:lstStyle/>
+          <a:p>
+            <a:pPr marL="0" indent="0">
+              <a:buNone/>
+            </a:pPr>
+            <a:r>
+              <a:rPr lang="en-US" dirty="0" smtClean="0">
+                <a:solidFill>
+                  <a:srgbClr val="595959"/>
+                </a:solidFill>
+              </a:rPr>
+              <a:t>Demo</a:t>
+            </a:r>
+            <a:endParaRPr lang="en-US" dirty="0">
+              <a:solidFill>
+                <a:srgbClr val="595959"/>
+              </a:solidFill>
+            </a:endParaRPr>
+          </a:p>
+        </p:txBody>
+      </p:sp>
+      <p:pic>
+        <p:nvPicPr>
+          <p:cNvPr id="5" name="Picture 4"/>
+          <p:cNvPicPr>
+            <a:picLocks noChangeAspect="1"/>
+          </p:cNvPicPr>
+          <p:nvPr/>
+        </p:nvPicPr>
+        <p:blipFill>
+          <a:blip r:embed="rId2"/>
+          <a:stretch>
+            <a:fillRect/>
+          </a:stretch>
+        </p:blipFill>
+        <p:spPr>
+          <a:xfrm>
+            <a:off x="2933949" y="1056786"/>
+            <a:ext cx="2389203" cy="4540112"/>
+          </a:xfrm>
+          <a:prstGeom prst="rect">
+            <a:avLst/>
+          </a:prstGeom>
+        </p:spPr>
+      </p:pic>
+      <p:pic>
+        <p:nvPicPr>
+          <p:cNvPr id="6" name="Picture 5"/>
+          <p:cNvPicPr>
+            <a:picLocks noChangeAspect="1"/>
+          </p:cNvPicPr>
+          <p:nvPr/>
+        </p:nvPicPr>
+        <p:blipFill>
+          <a:blip r:embed="rId3"/>
+          <a:stretch>
+            <a:fillRect/>
+          </a:stretch>
+        </p:blipFill>
+        <p:spPr>
+          <a:xfrm>
+            <a:off x="5708554" y="1056786"/>
+            <a:ext cx="2445641" cy="4540112"/>
+          </a:xfrm>
+          <a:prstGeom prst="rect">
+            <a:avLst/>
+          </a:prstGeom>
+        </p:spPr>
+      </p:pic>
+    </p:spTree>
+    <p:extLst>
+      <p:ext uri="{BB962C8B-B14F-4D97-AF65-F5344CB8AC3E}">
+        <p14:creationId xmlns:p14="http://schemas.microsoft.com/office/powerpoint/2010/main" val="1771025329"/>
+      </p:ext>
+    </p:extLst>
+  </p:cSld>
+  <p:clrMapOvr>
+    <a:masterClrMapping/>
+  </p:clrMapOvr>
+  <p:timing>
+    <p:tnLst>
+      <p:par>
+        <p:cTn xmlns:p14="http://schemas.microsoft.com/office/powerpoint/2010/main" id="1" dur="indefinite" restart="never" nodeType="tmRoot"/>
+      </p:par>
+    </p:tnLst>
+  </p:timing>
+</p:sld>
+</file>
+
+<file path=ppt/slides/slide8.xml><?xml version="1.0" encoding="utf-8"?>
 <p:sld xmlns:a="http://schemas.openxmlformats.org/drawingml/2006/main" xmlns:r="http://schemas.openxmlformats.org/officeDocument/2006/relationships" xmlns:p="http://schemas.openxmlformats.org/presentationml/2006/main">
   <p:cSld>
     <p:spTree>
@@ -5693,13 +5839,13 @@
         </p:nvSpPr>
         <p:spPr>
           <a:xfrm>
-            <a:off x="457200" y="5242475"/>
-            <a:ext cx="8229600" cy="1448068"/>
+            <a:off x="457199" y="5128370"/>
+            <a:ext cx="8488373" cy="827585"/>
           </a:xfrm>
         </p:spPr>
         <p:txBody>
           <a:bodyPr vert="horz" lIns="91440" tIns="45720" rIns="91440" bIns="45720" rtlCol="0">
-            <a:normAutofit fontScale="92500" lnSpcReduction="10000"/>
+            <a:normAutofit/>
           </a:bodyPr>
           <a:lstStyle/>
           <a:p>
@@ -5707,12 +5853,191 @@
               <a:buNone/>
             </a:pPr>
             <a:r>
-              <a:rPr lang="en-US" dirty="0" smtClean="0">
+              <a:rPr lang="en-US" sz="2400" dirty="0" smtClean="0">
                 <a:solidFill>
                   <a:srgbClr val="595959"/>
                 </a:solidFill>
               </a:rPr>
               <a:t>Bradley Cooper gets super human capabilities by taking a pill … he reads faster, comprehends better, retains information more, etc.</a:t>
+            </a:r>
+            <a:endParaRPr lang="en-US" sz="2400" dirty="0">
+              <a:solidFill>
+                <a:srgbClr val="595959"/>
+              </a:solidFill>
+            </a:endParaRPr>
+          </a:p>
+        </p:txBody>
+      </p:sp>
+      <p:sp>
+        <p:nvSpPr>
+          <p:cNvPr id="6" name="Content Placeholder 2"/>
+          <p:cNvSpPr txBox="1">
+            <a:spLocks/>
+          </p:cNvSpPr>
+          <p:nvPr/>
+        </p:nvSpPr>
+        <p:spPr>
+          <a:xfrm>
+            <a:off x="3333229" y="6165133"/>
+            <a:ext cx="2157373" cy="689042"/>
+          </a:xfrm>
+          <a:prstGeom prst="rect">
+            <a:avLst/>
+          </a:prstGeom>
+        </p:spPr>
+        <p:txBody>
+          <a:bodyPr vert="horz" lIns="91440" tIns="45720" rIns="91440" bIns="45720" rtlCol="0">
+            <a:normAutofit/>
+          </a:bodyPr>
+          <a:lstStyle>
+            <a:lvl1pPr marL="342900" indent="-342900" algn="l" defTabSz="457200" rtl="0" eaLnBrk="1" latinLnBrk="0" hangingPunct="1">
+              <a:spcBef>
+                <a:spcPct val="20000"/>
+              </a:spcBef>
+              <a:buFont typeface="Arial"/>
+              <a:buChar char="•"/>
+              <a:defRPr sz="3200" kern="1200">
+                <a:solidFill>
+                  <a:schemeClr val="tx1"/>
+                </a:solidFill>
+                <a:latin typeface="+mn-lt"/>
+                <a:ea typeface="+mn-ea"/>
+                <a:cs typeface="+mn-cs"/>
+              </a:defRPr>
+            </a:lvl1pPr>
+            <a:lvl2pPr marL="742950" indent="-285750" algn="l" defTabSz="457200" rtl="0" eaLnBrk="1" latinLnBrk="0" hangingPunct="1">
+              <a:spcBef>
+                <a:spcPct val="20000"/>
+              </a:spcBef>
+              <a:buFont typeface="Arial"/>
+              <a:buChar char="–"/>
+              <a:defRPr sz="2800" kern="1200">
+                <a:solidFill>
+                  <a:schemeClr val="tx1"/>
+                </a:solidFill>
+                <a:latin typeface="+mn-lt"/>
+                <a:ea typeface="+mn-ea"/>
+                <a:cs typeface="+mn-cs"/>
+              </a:defRPr>
+            </a:lvl2pPr>
+            <a:lvl3pPr marL="1143000" indent="-228600" algn="l" defTabSz="457200" rtl="0" eaLnBrk="1" latinLnBrk="0" hangingPunct="1">
+              <a:spcBef>
+                <a:spcPct val="20000"/>
+              </a:spcBef>
+              <a:buFont typeface="Arial"/>
+              <a:buChar char="•"/>
+              <a:defRPr sz="2400" kern="1200">
+                <a:solidFill>
+                  <a:schemeClr val="tx1"/>
+                </a:solidFill>
+                <a:latin typeface="+mn-lt"/>
+                <a:ea typeface="+mn-ea"/>
+                <a:cs typeface="+mn-cs"/>
+              </a:defRPr>
+            </a:lvl3pPr>
+            <a:lvl4pPr marL="1600200" indent="-228600" algn="l" defTabSz="457200" rtl="0" eaLnBrk="1" latinLnBrk="0" hangingPunct="1">
+              <a:spcBef>
+                <a:spcPct val="20000"/>
+              </a:spcBef>
+              <a:buFont typeface="Arial"/>
+              <a:buChar char="–"/>
+              <a:defRPr sz="2000" kern="1200">
+                <a:solidFill>
+                  <a:schemeClr val="tx1"/>
+                </a:solidFill>
+                <a:latin typeface="+mn-lt"/>
+                <a:ea typeface="+mn-ea"/>
+                <a:cs typeface="+mn-cs"/>
+              </a:defRPr>
+            </a:lvl4pPr>
+            <a:lvl5pPr marL="2057400" indent="-228600" algn="l" defTabSz="457200" rtl="0" eaLnBrk="1" latinLnBrk="0" hangingPunct="1">
+              <a:spcBef>
+                <a:spcPct val="20000"/>
+              </a:spcBef>
+              <a:buFont typeface="Arial"/>
+              <a:buChar char="»"/>
+              <a:defRPr sz="2000" kern="1200">
+                <a:solidFill>
+                  <a:schemeClr val="tx1"/>
+                </a:solidFill>
+                <a:latin typeface="+mn-lt"/>
+                <a:ea typeface="+mn-ea"/>
+                <a:cs typeface="+mn-cs"/>
+              </a:defRPr>
+            </a:lvl5pPr>
+            <a:lvl6pPr marL="2514600" indent="-228600" algn="l" defTabSz="457200" rtl="0" eaLnBrk="1" latinLnBrk="0" hangingPunct="1">
+              <a:spcBef>
+                <a:spcPct val="20000"/>
+              </a:spcBef>
+              <a:buFont typeface="Arial"/>
+              <a:buChar char="•"/>
+              <a:defRPr sz="2000" kern="1200">
+                <a:solidFill>
+                  <a:schemeClr val="tx1"/>
+                </a:solidFill>
+                <a:latin typeface="+mn-lt"/>
+                <a:ea typeface="+mn-ea"/>
+                <a:cs typeface="+mn-cs"/>
+              </a:defRPr>
+            </a:lvl6pPr>
+            <a:lvl7pPr marL="2971800" indent="-228600" algn="l" defTabSz="457200" rtl="0" eaLnBrk="1" latinLnBrk="0" hangingPunct="1">
+              <a:spcBef>
+                <a:spcPct val="20000"/>
+              </a:spcBef>
+              <a:buFont typeface="Arial"/>
+              <a:buChar char="•"/>
+              <a:defRPr sz="2000" kern="1200">
+                <a:solidFill>
+                  <a:schemeClr val="tx1"/>
+                </a:solidFill>
+                <a:latin typeface="+mn-lt"/>
+                <a:ea typeface="+mn-ea"/>
+                <a:cs typeface="+mn-cs"/>
+              </a:defRPr>
+            </a:lvl7pPr>
+            <a:lvl8pPr marL="3429000" indent="-228600" algn="l" defTabSz="457200" rtl="0" eaLnBrk="1" latinLnBrk="0" hangingPunct="1">
+              <a:spcBef>
+                <a:spcPct val="20000"/>
+              </a:spcBef>
+              <a:buFont typeface="Arial"/>
+              <a:buChar char="•"/>
+              <a:defRPr sz="2000" kern="1200">
+                <a:solidFill>
+                  <a:schemeClr val="tx1"/>
+                </a:solidFill>
+                <a:latin typeface="+mn-lt"/>
+                <a:ea typeface="+mn-ea"/>
+                <a:cs typeface="+mn-cs"/>
+              </a:defRPr>
+            </a:lvl8pPr>
+            <a:lvl9pPr marL="3886200" indent="-228600" algn="l" defTabSz="457200" rtl="0" eaLnBrk="1" latinLnBrk="0" hangingPunct="1">
+              <a:spcBef>
+                <a:spcPct val="20000"/>
+              </a:spcBef>
+              <a:buFont typeface="Arial"/>
+              <a:buChar char="•"/>
+              <a:defRPr sz="2000" kern="1200">
+                <a:solidFill>
+                  <a:schemeClr val="tx1"/>
+                </a:solidFill>
+                <a:latin typeface="+mn-lt"/>
+                <a:ea typeface="+mn-ea"/>
+                <a:cs typeface="+mn-cs"/>
+              </a:defRPr>
+            </a:lvl9pPr>
+          </a:lstStyle>
+          <a:p>
+            <a:pPr marL="0" indent="0">
+              <a:buFont typeface="Arial"/>
+              <a:buNone/>
+            </a:pPr>
+            <a:r>
+              <a:rPr lang="en-US" dirty="0" smtClean="0">
+                <a:solidFill>
+                  <a:srgbClr val="595959"/>
+                </a:solidFill>
+              </a:rPr>
+              <a:t>Thank You</a:t>
             </a:r>
             <a:endParaRPr lang="en-US" dirty="0">
               <a:solidFill>
@@ -5732,156 +6057,13 @@
   <p:clrMapOvr>
     <a:masterClrMapping/>
   </p:clrMapOvr>
-</p:sld>
-</file>
-
-<file path=ppt/slides/slide8.xml><?xml version="1.0" encoding="utf-8"?>
-<p:sld xmlns:a="http://schemas.openxmlformats.org/drawingml/2006/main" xmlns:r="http://schemas.openxmlformats.org/officeDocument/2006/relationships" xmlns:p="http://schemas.openxmlformats.org/presentationml/2006/main">
-  <p:cSld>
-    <p:spTree>
-      <p:nvGrpSpPr>
-        <p:cNvPr id="1" name=""/>
-        <p:cNvGrpSpPr/>
-        <p:nvPr/>
-      </p:nvGrpSpPr>
-      <p:grpSpPr>
-        <a:xfrm>
-          <a:off x="0" y="0"/>
-          <a:ext cx="0" cy="0"/>
-          <a:chOff x="0" y="0"/>
-          <a:chExt cx="0" cy="0"/>
-        </a:xfrm>
-      </p:grpSpPr>
-      <p:sp>
-        <p:nvSpPr>
-          <p:cNvPr id="4" name="Content Placeholder 2"/>
-          <p:cNvSpPr>
-            <a:spLocks noGrp="1"/>
-          </p:cNvSpPr>
-          <p:nvPr>
-            <p:ph idx="1"/>
-          </p:nvPr>
-        </p:nvSpPr>
-        <p:spPr>
-          <a:xfrm>
-            <a:off x="457200" y="4708160"/>
-            <a:ext cx="8229600" cy="1966895"/>
-          </a:xfrm>
-        </p:spPr>
-        <p:txBody>
-          <a:bodyPr vert="horz" lIns="91440" tIns="45720" rIns="91440" bIns="45720" rtlCol="0">
-            <a:normAutofit/>
-          </a:bodyPr>
-          <a:lstStyle/>
-          <a:p>
-            <a:pPr marL="0" indent="0">
-              <a:buNone/>
-            </a:pPr>
-            <a:r>
-              <a:rPr lang="en-US" dirty="0" smtClean="0">
-                <a:solidFill>
-                  <a:srgbClr val="595959"/>
-                </a:solidFill>
-              </a:rPr>
-              <a:t>Demo</a:t>
-            </a:r>
-            <a:endParaRPr lang="en-US" dirty="0">
-              <a:solidFill>
-                <a:srgbClr val="595959"/>
-              </a:solidFill>
-            </a:endParaRPr>
-          </a:p>
-        </p:txBody>
-      </p:sp>
-    </p:spTree>
-    <p:extLst>
-      <p:ext uri="{BB962C8B-B14F-4D97-AF65-F5344CB8AC3E}">
-        <p14:creationId xmlns:p14="http://schemas.microsoft.com/office/powerpoint/2010/main" val="1771025329"/>
-      </p:ext>
-    </p:extLst>
-  </p:cSld>
-  <p:clrMapOvr>
-    <a:masterClrMapping/>
-  </p:clrMapOvr>
-</p:sld>
-</file>
-
-<file path=ppt/slides/slide9.xml><?xml version="1.0" encoding="utf-8"?>
-<p:sld xmlns:a="http://schemas.openxmlformats.org/drawingml/2006/main" xmlns:r="http://schemas.openxmlformats.org/officeDocument/2006/relationships" xmlns:p="http://schemas.openxmlformats.org/presentationml/2006/main">
-  <p:cSld>
-    <p:spTree>
-      <p:nvGrpSpPr>
-        <p:cNvPr id="1" name=""/>
-        <p:cNvGrpSpPr/>
-        <p:nvPr/>
-      </p:nvGrpSpPr>
-      <p:grpSpPr>
-        <a:xfrm>
-          <a:off x="0" y="0"/>
-          <a:ext cx="0" cy="0"/>
-          <a:chOff x="0" y="0"/>
-          <a:chExt cx="0" cy="0"/>
-        </a:xfrm>
-      </p:grpSpPr>
-      <p:sp>
-        <p:nvSpPr>
-          <p:cNvPr id="4" name="Content Placeholder 2"/>
-          <p:cNvSpPr>
-            <a:spLocks noGrp="1"/>
-          </p:cNvSpPr>
-          <p:nvPr>
-            <p:ph idx="1"/>
-          </p:nvPr>
-        </p:nvSpPr>
-        <p:spPr>
-          <a:xfrm>
-            <a:off x="457200" y="4708160"/>
-            <a:ext cx="8229600" cy="1966895"/>
-          </a:xfrm>
-        </p:spPr>
-        <p:txBody>
-          <a:bodyPr vert="horz" lIns="91440" tIns="45720" rIns="91440" bIns="45720" rtlCol="0">
-            <a:normAutofit/>
-          </a:bodyPr>
-          <a:lstStyle/>
-          <a:p>
-            <a:pPr marL="0" indent="0">
-              <a:buNone/>
-            </a:pPr>
-            <a:r>
-              <a:rPr lang="en-US" dirty="0">
-                <a:solidFill>
-                  <a:srgbClr val="595959"/>
-                </a:solidFill>
-              </a:rPr>
-              <a:t>Thank </a:t>
-            </a:r>
-            <a:r>
-              <a:rPr lang="en-US" dirty="0" smtClean="0">
-                <a:solidFill>
-                  <a:srgbClr val="595959"/>
-                </a:solidFill>
-              </a:rPr>
-              <a:t>You</a:t>
-            </a:r>
-            <a:endParaRPr lang="en-US" dirty="0">
-              <a:solidFill>
-                <a:srgbClr val="595959"/>
-              </a:solidFill>
-            </a:endParaRPr>
-          </a:p>
-        </p:txBody>
-      </p:sp>
-    </p:spTree>
-    <p:extLst>
-      <p:ext uri="{BB962C8B-B14F-4D97-AF65-F5344CB8AC3E}">
-        <p14:creationId xmlns:p14="http://schemas.microsoft.com/office/powerpoint/2010/main" val="2867249"/>
-      </p:ext>
-    </p:extLst>
-  </p:cSld>
-  <p:clrMapOvr>
-    <a:masterClrMapping/>
-  </p:clrMapOvr>
+  <p:timing>
+    <p:tnLst>
+      <p:par>
+        <p:cTn xmlns:p14="http://schemas.microsoft.com/office/powerpoint/2010/main" id="1" dur="indefinite" restart="never" nodeType="tmRoot"/>
+      </p:par>
+    </p:tnLst>
+  </p:timing>
 </p:sld>
 </file>
 

</xml_diff>